<commit_message>
Add Support For PPTX Shape Groups (Fix in code design to not miss out on slide content) (#331)
* Adds support for Shape Groups

* Update to Test PPtx for nested shape

* This line was accidentally removed and is added back here
</commit_message>
<xml_diff>
--- a/packages/markitdown/tests/test_files/test.pptx
+++ b/packages/markitdown/tests/test_files/test.pptx
@@ -9,6 +9,7 @@
     <p:sldId id="257" r:id="rId3"/>
     <p:sldId id="258" r:id="rId4"/>
     <p:sldId id="259" r:id="rId5"/>
+    <p:sldId id="260" r:id="rId6"/>
   </p:sldIdLst>
   <p:sldSz cx="12192000" cy="6858000"/>
   <p:notesSz cx="6858000" cy="9144000"/>
@@ -126,7 +127,7 @@
 <file path=ppt/charts/chart1.xml><?xml version="1.0" encoding="utf-8"?>
 <c:chartSpace xmlns:c="http://schemas.openxmlformats.org/drawingml/2006/chart" xmlns:a="http://schemas.openxmlformats.org/drawingml/2006/main" xmlns:r="http://schemas.openxmlformats.org/officeDocument/2006/relationships" xmlns:c16r2="http://schemas.microsoft.com/office/drawing/2015/06/chart">
   <c:date1904 val="0"/>
-  <c:lang val="ja-JP"/>
+  <c:lang val="en-US"/>
   <c:roundedCorners val="0"/>
   <mc:AlternateContent xmlns:mc="http://schemas.openxmlformats.org/markup-compatibility/2006">
     <mc:Choice xmlns:c14="http://schemas.microsoft.com/office/drawing/2007/8/2/chart" Requires="c14">
@@ -144,7 +145,7 @@
           <a:lstStyle/>
           <a:p>
             <a:pPr>
-              <a:defRPr sz="1862" b="0" i="0" u="none" strike="noStrike" kern="1200" spc="0" baseline="0">
+              <a:defRPr lang="ja-JP" sz="1862" b="0" i="0" u="none" strike="noStrike" kern="1200" spc="0" baseline="0">
                 <a:solidFill>
                   <a:schemeClr val="tx1">
                     <a:lumMod val="65000"/>
@@ -176,7 +177,7 @@
         <a:lstStyle/>
         <a:p>
           <a:pPr>
-            <a:defRPr sz="1862" b="0" i="0" u="none" strike="noStrike" kern="1200" spc="0" baseline="0">
+            <a:defRPr lang="ja-JP" sz="1862" b="0" i="0" u="none" strike="noStrike" kern="1200" spc="0" baseline="0">
               <a:solidFill>
                 <a:schemeClr val="tx1">
                   <a:lumMod val="65000"/>
@@ -188,7 +189,7 @@
               <a:cs typeface="+mn-cs"/>
             </a:defRPr>
           </a:pPr>
-          <a:endParaRPr lang="ja-JP"/>
+          <a:endParaRPr lang="en-US"/>
         </a:p>
       </c:txPr>
     </c:title>
@@ -313,7 +314,7 @@
           <a:lstStyle/>
           <a:p>
             <a:pPr>
-              <a:defRPr sz="1197" b="0" i="0" u="none" strike="noStrike" kern="1200" baseline="0">
+              <a:defRPr lang="ja-JP" sz="1197" b="0" i="0" u="none" strike="noStrike" kern="1200" baseline="0">
                 <a:solidFill>
                   <a:schemeClr val="tx1">
                     <a:lumMod val="65000"/>
@@ -325,7 +326,7 @@
                 <a:cs typeface="+mn-cs"/>
               </a:defRPr>
             </a:pPr>
-            <a:endParaRPr lang="ja-JP"/>
+            <a:endParaRPr lang="en-US"/>
           </a:p>
         </c:txPr>
         <c:crossAx val="1304246911"/>
@@ -372,7 +373,7 @@
           <a:lstStyle/>
           <a:p>
             <a:pPr>
-              <a:defRPr sz="1197" b="0" i="0" u="none" strike="noStrike" kern="1200" baseline="0">
+              <a:defRPr lang="ja-JP" sz="1197" b="0" i="0" u="none" strike="noStrike" kern="1200" baseline="0">
                 <a:solidFill>
                   <a:schemeClr val="tx1">
                     <a:lumMod val="65000"/>
@@ -384,7 +385,7 @@
                 <a:cs typeface="+mn-cs"/>
               </a:defRPr>
             </a:pPr>
-            <a:endParaRPr lang="ja-JP"/>
+            <a:endParaRPr lang="en-US"/>
           </a:p>
         </c:txPr>
         <c:crossAx val="1305054911"/>
@@ -414,7 +415,7 @@
         <a:lstStyle/>
         <a:p>
           <a:pPr>
-            <a:defRPr sz="1197" b="0" i="0" u="none" strike="noStrike" kern="1200" baseline="0">
+            <a:defRPr lang="ja-JP" sz="1197" b="0" i="0" u="none" strike="noStrike" kern="1200" baseline="0">
               <a:solidFill>
                 <a:schemeClr val="tx1">
                   <a:lumMod val="65000"/>
@@ -426,7 +427,7 @@
               <a:cs typeface="+mn-cs"/>
             </a:defRPr>
           </a:pPr>
-          <a:endParaRPr lang="ja-JP"/>
+          <a:endParaRPr lang="en-US"/>
         </a:p>
       </c:txPr>
     </c:legend>
@@ -448,7 +449,7 @@
       <a:pPr>
         <a:defRPr/>
       </a:pPr>
-      <a:endParaRPr lang="ja-JP"/>
+      <a:endParaRPr lang="en-US"/>
     </a:p>
   </c:txPr>
   <c:externalData r:id="rId3">
@@ -1147,7 +1148,7 @@
           <a:p>
             <a:fld id="{71E1FA23-2560-4B92-B796-4AF66AC1B7E7}" type="datetimeFigureOut">
               <a:rPr lang="en-US" smtClean="0"/>
-              <a:t>12/14/2024</a:t>
+              <a:t>2/12/2025</a:t>
             </a:fld>
             <a:endParaRPr lang="en-US"/>
           </a:p>
@@ -1345,7 +1346,7 @@
           <a:p>
             <a:fld id="{71E1FA23-2560-4B92-B796-4AF66AC1B7E7}" type="datetimeFigureOut">
               <a:rPr lang="en-US" smtClean="0"/>
-              <a:t>12/14/2024</a:t>
+              <a:t>2/12/2025</a:t>
             </a:fld>
             <a:endParaRPr lang="en-US"/>
           </a:p>
@@ -1553,7 +1554,7 @@
           <a:p>
             <a:fld id="{71E1FA23-2560-4B92-B796-4AF66AC1B7E7}" type="datetimeFigureOut">
               <a:rPr lang="en-US" smtClean="0"/>
-              <a:t>12/14/2024</a:t>
+              <a:t>2/12/2025</a:t>
             </a:fld>
             <a:endParaRPr lang="en-US"/>
           </a:p>
@@ -1751,7 +1752,7 @@
           <a:p>
             <a:fld id="{71E1FA23-2560-4B92-B796-4AF66AC1B7E7}" type="datetimeFigureOut">
               <a:rPr lang="en-US" smtClean="0"/>
-              <a:t>12/14/2024</a:t>
+              <a:t>2/12/2025</a:t>
             </a:fld>
             <a:endParaRPr lang="en-US"/>
           </a:p>
@@ -2026,7 +2027,7 @@
           <a:p>
             <a:fld id="{71E1FA23-2560-4B92-B796-4AF66AC1B7E7}" type="datetimeFigureOut">
               <a:rPr lang="en-US" smtClean="0"/>
-              <a:t>12/14/2024</a:t>
+              <a:t>2/12/2025</a:t>
             </a:fld>
             <a:endParaRPr lang="en-US"/>
           </a:p>
@@ -2291,7 +2292,7 @@
           <a:p>
             <a:fld id="{71E1FA23-2560-4B92-B796-4AF66AC1B7E7}" type="datetimeFigureOut">
               <a:rPr lang="en-US" smtClean="0"/>
-              <a:t>12/14/2024</a:t>
+              <a:t>2/12/2025</a:t>
             </a:fld>
             <a:endParaRPr lang="en-US"/>
           </a:p>
@@ -2703,7 +2704,7 @@
           <a:p>
             <a:fld id="{71E1FA23-2560-4B92-B796-4AF66AC1B7E7}" type="datetimeFigureOut">
               <a:rPr lang="en-US" smtClean="0"/>
-              <a:t>12/14/2024</a:t>
+              <a:t>2/12/2025</a:t>
             </a:fld>
             <a:endParaRPr lang="en-US"/>
           </a:p>
@@ -2844,7 +2845,7 @@
           <a:p>
             <a:fld id="{71E1FA23-2560-4B92-B796-4AF66AC1B7E7}" type="datetimeFigureOut">
               <a:rPr lang="en-US" smtClean="0"/>
-              <a:t>12/14/2024</a:t>
+              <a:t>2/12/2025</a:t>
             </a:fld>
             <a:endParaRPr lang="en-US"/>
           </a:p>
@@ -2957,7 +2958,7 @@
           <a:p>
             <a:fld id="{71E1FA23-2560-4B92-B796-4AF66AC1B7E7}" type="datetimeFigureOut">
               <a:rPr lang="en-US" smtClean="0"/>
-              <a:t>12/14/2024</a:t>
+              <a:t>2/12/2025</a:t>
             </a:fld>
             <a:endParaRPr lang="en-US"/>
           </a:p>
@@ -3268,7 +3269,7 @@
           <a:p>
             <a:fld id="{71E1FA23-2560-4B92-B796-4AF66AC1B7E7}" type="datetimeFigureOut">
               <a:rPr lang="en-US" smtClean="0"/>
-              <a:t>12/14/2024</a:t>
+              <a:t>2/12/2025</a:t>
             </a:fld>
             <a:endParaRPr lang="en-US"/>
           </a:p>
@@ -3556,7 +3557,7 @@
           <a:p>
             <a:fld id="{71E1FA23-2560-4B92-B796-4AF66AC1B7E7}" type="datetimeFigureOut">
               <a:rPr lang="en-US" smtClean="0"/>
-              <a:t>12/14/2024</a:t>
+              <a:t>2/12/2025</a:t>
             </a:fld>
             <a:endParaRPr lang="en-US"/>
           </a:p>
@@ -3797,7 +3798,7 @@
           <a:p>
             <a:fld id="{71E1FA23-2560-4B92-B796-4AF66AC1B7E7}" type="datetimeFigureOut">
               <a:rPr lang="en-US" smtClean="0"/>
-              <a:t>12/14/2024</a:t>
+              <a:t>2/12/2025</a:t>
             </a:fld>
             <a:endParaRPr lang="en-US"/>
           </a:p>
@@ -5213,6 +5214,447 @@
 </p:sld>
 </file>
 
+<file path=ppt/slides/slide5.xml><?xml version="1.0" encoding="utf-8"?>
+<p:sld xmlns:a="http://schemas.openxmlformats.org/drawingml/2006/main" xmlns:r="http://schemas.openxmlformats.org/officeDocument/2006/relationships" xmlns:p="http://schemas.openxmlformats.org/presentationml/2006/main">
+  <p:cSld>
+    <p:spTree>
+      <p:nvGrpSpPr>
+        <p:cNvPr id="1" name=""/>
+        <p:cNvGrpSpPr/>
+        <p:nvPr/>
+      </p:nvGrpSpPr>
+      <p:grpSpPr>
+        <a:xfrm>
+          <a:off x="0" y="0"/>
+          <a:ext cx="0" cy="0"/>
+          <a:chOff x="0" y="0"/>
+          <a:chExt cx="0" cy="0"/>
+        </a:xfrm>
+      </p:grpSpPr>
+      <p:sp>
+        <p:nvSpPr>
+          <p:cNvPr id="2" name="Title 1">
+            <a:extLst>
+              <a:ext uri="{FF2B5EF4-FFF2-40B4-BE49-F238E27FC236}">
+                <a16:creationId xmlns:a16="http://schemas.microsoft.com/office/drawing/2014/main" id="{E63D3B66-7AEB-08D8-C4C2-60A5194F58CF}"/>
+              </a:ext>
+            </a:extLst>
+          </p:cNvPr>
+          <p:cNvSpPr>
+            <a:spLocks noGrp="1"/>
+          </p:cNvSpPr>
+          <p:nvPr>
+            <p:ph type="title"/>
+          </p:nvPr>
+        </p:nvSpPr>
+        <p:spPr/>
+        <p:txBody>
+          <a:bodyPr/>
+          <a:lstStyle/>
+          <a:p>
+            <a:r>
+              <a:rPr lang="en-US" dirty="0"/>
+              <a:t>A Nested Shape parsing</a:t>
+            </a:r>
+          </a:p>
+        </p:txBody>
+      </p:sp>
+      <p:grpSp>
+        <p:nvGrpSpPr>
+          <p:cNvPr id="6" name="Group 5">
+            <a:extLst>
+              <a:ext uri="{FF2B5EF4-FFF2-40B4-BE49-F238E27FC236}">
+                <a16:creationId xmlns:a16="http://schemas.microsoft.com/office/drawing/2014/main" id="{449732FA-2A69-C555-5779-2E7A4B17F7F9}"/>
+              </a:ext>
+            </a:extLst>
+          </p:cNvPr>
+          <p:cNvGrpSpPr/>
+          <p:nvPr/>
+        </p:nvGrpSpPr>
+        <p:grpSpPr>
+          <a:xfrm>
+            <a:off x="3419318" y="1597025"/>
+            <a:ext cx="5636260" cy="4895850"/>
+            <a:chOff x="368300" y="1222375"/>
+            <a:chExt cx="5636260" cy="4895850"/>
+          </a:xfrm>
+        </p:grpSpPr>
+        <p:sp>
+          <p:nvSpPr>
+            <p:cNvPr id="7" name="Rounded Rectangle 20">
+              <a:extLst>
+                <a:ext uri="{FF2B5EF4-FFF2-40B4-BE49-F238E27FC236}">
+                  <a16:creationId xmlns:a16="http://schemas.microsoft.com/office/drawing/2014/main" id="{B4317B83-671A-F0E1-C71F-D6FCD40BAA28}"/>
+                </a:ext>
+              </a:extLst>
+            </p:cNvPr>
+            <p:cNvSpPr/>
+            <p:nvPr/>
+          </p:nvSpPr>
+          <p:spPr bwMode="gray">
+            <a:xfrm>
+              <a:off x="368300" y="1222375"/>
+              <a:ext cx="5629858" cy="446617"/>
+            </a:xfrm>
+            <a:prstGeom prst="roundRect">
+              <a:avLst>
+                <a:gd name="adj" fmla="val 50000"/>
+              </a:avLst>
+            </a:prstGeom>
+            <a:solidFill>
+              <a:schemeClr val="accent1"/>
+            </a:solidFill>
+            <a:ln cap="flat">
+              <a:noFill/>
+              <a:prstDash val="solid"/>
+              <a:miter lim="800000"/>
+            </a:ln>
+            <a:effectLst/>
+          </p:spPr>
+          <p:txBody>
+            <a:bodyPr lIns="180000" tIns="0" rIns="180000" bIns="0" anchor="ctr" anchorCtr="0"/>
+            <a:lstStyle>
+              <a:lvl1pPr marL="0" indent="0" algn="l" defTabSz="455612" rtl="0" eaLnBrk="1" hangingPunct="1">
+                <a:buNone/>
+                <a:defRPr lang="en-US" altLang="en-US" sz="1800">
+                  <a:solidFill>
+                    <a:schemeClr val="tx1"/>
+                  </a:solidFill>
+                  <a:latin typeface="Arial"/>
+                  <a:ea typeface="Arial"/>
+                </a:defRPr>
+              </a:lvl1pPr>
+              <a:lvl2pPr marL="455612" indent="0" algn="l" defTabSz="455612" rtl="0" eaLnBrk="1" hangingPunct="1">
+                <a:buNone/>
+                <a:defRPr lang="en-US" altLang="en-US" sz="1800">
+                  <a:solidFill>
+                    <a:schemeClr val="tx1"/>
+                  </a:solidFill>
+                  <a:latin typeface="Arial"/>
+                  <a:ea typeface="Arial"/>
+                </a:defRPr>
+              </a:lvl2pPr>
+              <a:lvl3pPr marL="912812" indent="0" algn="l" defTabSz="455612" rtl="0" eaLnBrk="1" hangingPunct="1">
+                <a:buNone/>
+                <a:defRPr lang="en-US" altLang="en-US" sz="1800">
+                  <a:solidFill>
+                    <a:schemeClr val="tx1"/>
+                  </a:solidFill>
+                  <a:latin typeface="Arial"/>
+                  <a:ea typeface="Arial"/>
+                </a:defRPr>
+              </a:lvl3pPr>
+              <a:lvl4pPr marL="1370012" indent="0" algn="l" defTabSz="455612" rtl="0" eaLnBrk="1" hangingPunct="1">
+                <a:buNone/>
+                <a:defRPr lang="en-US" altLang="en-US" sz="1800">
+                  <a:solidFill>
+                    <a:schemeClr val="tx1"/>
+                  </a:solidFill>
+                  <a:latin typeface="Arial"/>
+                  <a:ea typeface="Arial"/>
+                </a:defRPr>
+              </a:lvl4pPr>
+              <a:lvl5pPr marL="1827212" indent="0" algn="l" defTabSz="455612" rtl="0" eaLnBrk="1" hangingPunct="1">
+                <a:buNone/>
+                <a:defRPr lang="en-US" altLang="en-US" sz="1800">
+                  <a:solidFill>
+                    <a:schemeClr val="tx1"/>
+                  </a:solidFill>
+                  <a:latin typeface="Arial"/>
+                  <a:ea typeface="Arial"/>
+                </a:defRPr>
+              </a:lvl5pPr>
+            </a:lstStyle>
+            <a:p>
+              <a:pPr lvl="0"/>
+              <a:r>
+                <a:rPr lang="en-US" sz="1600" cap="all" dirty="0">
+                  <a:solidFill>
+                    <a:srgbClr val="FFFFFF"/>
+                  </a:solidFill>
+                  <a:latin typeface="Gill Sans MT" panose="020B0502020104020203" pitchFamily="34" charset="77"/>
+                  <a:sym typeface="Apple SD 산돌고딕 Neo 옅은체"/>
+                </a:rPr>
+                <a:t>Nested Shape</a:t>
+              </a:r>
+            </a:p>
+          </p:txBody>
+        </p:sp>
+        <p:sp>
+          <p:nvSpPr>
+            <p:cNvPr id="8" name="Rounded Rectangle 20">
+              <a:extLst>
+                <a:ext uri="{FF2B5EF4-FFF2-40B4-BE49-F238E27FC236}">
+                  <a16:creationId xmlns:a16="http://schemas.microsoft.com/office/drawing/2014/main" id="{4FB0322A-CBD3-312E-22CA-9608CB31E05A}"/>
+                </a:ext>
+              </a:extLst>
+            </p:cNvPr>
+            <p:cNvSpPr/>
+            <p:nvPr/>
+          </p:nvSpPr>
+          <p:spPr bwMode="gray">
+            <a:xfrm>
+              <a:off x="368300" y="6033558"/>
+              <a:ext cx="5634038" cy="84667"/>
+            </a:xfrm>
+            <a:prstGeom prst="roundRect">
+              <a:avLst>
+                <a:gd name="adj" fmla="val 0"/>
+              </a:avLst>
+            </a:prstGeom>
+            <a:solidFill>
+              <a:srgbClr val="00A4E3"/>
+            </a:solidFill>
+            <a:ln cap="flat">
+              <a:noFill/>
+              <a:prstDash val="solid"/>
+              <a:miter lim="800000"/>
+            </a:ln>
+            <a:effectLst/>
+          </p:spPr>
+          <p:txBody>
+            <a:bodyPr lIns="0" tIns="0" rIns="0" bIns="0" anchor="ctr" anchorCtr="0"/>
+            <a:lstStyle>
+              <a:lvl1pPr marL="0" indent="0" algn="l" defTabSz="455612" rtl="0" eaLnBrk="1" hangingPunct="1">
+                <a:buNone/>
+                <a:defRPr lang="en-US" altLang="en-US" sz="1800">
+                  <a:solidFill>
+                    <a:schemeClr val="tx1"/>
+                  </a:solidFill>
+                  <a:latin typeface="Arial"/>
+                  <a:ea typeface="Arial"/>
+                </a:defRPr>
+              </a:lvl1pPr>
+              <a:lvl2pPr marL="455612" indent="0" algn="l" defTabSz="455612" rtl="0" eaLnBrk="1" hangingPunct="1">
+                <a:buNone/>
+                <a:defRPr lang="en-US" altLang="en-US" sz="1800">
+                  <a:solidFill>
+                    <a:schemeClr val="tx1"/>
+                  </a:solidFill>
+                  <a:latin typeface="Arial"/>
+                  <a:ea typeface="Arial"/>
+                </a:defRPr>
+              </a:lvl2pPr>
+              <a:lvl3pPr marL="912812" indent="0" algn="l" defTabSz="455612" rtl="0" eaLnBrk="1" hangingPunct="1">
+                <a:buNone/>
+                <a:defRPr lang="en-US" altLang="en-US" sz="1800">
+                  <a:solidFill>
+                    <a:schemeClr val="tx1"/>
+                  </a:solidFill>
+                  <a:latin typeface="Arial"/>
+                  <a:ea typeface="Arial"/>
+                </a:defRPr>
+              </a:lvl3pPr>
+              <a:lvl4pPr marL="1370012" indent="0" algn="l" defTabSz="455612" rtl="0" eaLnBrk="1" hangingPunct="1">
+                <a:buNone/>
+                <a:defRPr lang="en-US" altLang="en-US" sz="1800">
+                  <a:solidFill>
+                    <a:schemeClr val="tx1"/>
+                  </a:solidFill>
+                  <a:latin typeface="Arial"/>
+                  <a:ea typeface="Arial"/>
+                </a:defRPr>
+              </a:lvl4pPr>
+              <a:lvl5pPr marL="1827212" indent="0" algn="l" defTabSz="455612" rtl="0" eaLnBrk="1" hangingPunct="1">
+                <a:buNone/>
+                <a:defRPr lang="en-US" altLang="en-US" sz="1800">
+                  <a:solidFill>
+                    <a:schemeClr val="tx1"/>
+                  </a:solidFill>
+                  <a:latin typeface="Arial"/>
+                  <a:ea typeface="Arial"/>
+                </a:defRPr>
+              </a:lvl5pPr>
+            </a:lstStyle>
+            <a:p>
+              <a:pPr lvl="0" algn="ctr">
+                <a:lnSpc>
+                  <a:spcPct val="85000"/>
+                </a:lnSpc>
+              </a:pPr>
+              <a:r>
+                <a:rPr lang="en-US" sz="1333" dirty="0">
+                  <a:solidFill>
+                    <a:srgbClr val="FFFFFF"/>
+                  </a:solidFill>
+                  <a:latin typeface="Gill Sans MT" panose="020B0502020104020203" pitchFamily="34" charset="77"/>
+                  <a:sym typeface="Apple SD 산돌고딕 Neo 옅은체"/>
+                </a:rPr>
+                <a:t> </a:t>
+              </a:r>
+            </a:p>
+          </p:txBody>
+        </p:sp>
+        <p:sp>
+          <p:nvSpPr>
+            <p:cNvPr id="9" name="Rectangle 83">
+              <a:extLst>
+                <a:ext uri="{FF2B5EF4-FFF2-40B4-BE49-F238E27FC236}">
+                  <a16:creationId xmlns:a16="http://schemas.microsoft.com/office/drawing/2014/main" id="{258CD042-39A5-89E9-0A7B-38F790E376B2}"/>
+                </a:ext>
+              </a:extLst>
+            </p:cNvPr>
+            <p:cNvSpPr/>
+            <p:nvPr/>
+          </p:nvSpPr>
+          <p:spPr bwMode="gray">
+            <a:xfrm>
+              <a:off x="368300" y="1668946"/>
+              <a:ext cx="5636260" cy="4364611"/>
+            </a:xfrm>
+            <a:prstGeom prst="rect">
+              <a:avLst/>
+            </a:prstGeom>
+            <a:noFill/>
+            <a:ln cap="flat">
+              <a:noFill/>
+              <a:prstDash val="solid"/>
+              <a:round/>
+              <a:headEnd type="none" w="med" len="med"/>
+              <a:tailEnd type="none" w="med" len="med"/>
+            </a:ln>
+          </p:spPr>
+          <p:txBody>
+            <a:bodyPr wrap="square" lIns="180000" tIns="108000" rIns="180000" bIns="108000" anchor="t" anchorCtr="0">
+              <a:noAutofit/>
+            </a:bodyPr>
+            <a:lstStyle>
+              <a:lvl1pPr marL="0" indent="0" algn="l" defTabSz="455612" rtl="0" eaLnBrk="1" hangingPunct="1">
+                <a:buNone/>
+                <a:defRPr lang="en-US" altLang="en-US" sz="1800">
+                  <a:solidFill>
+                    <a:schemeClr val="tx1"/>
+                  </a:solidFill>
+                  <a:latin typeface="Arial"/>
+                  <a:ea typeface="Arial"/>
+                </a:defRPr>
+              </a:lvl1pPr>
+              <a:lvl2pPr marL="455612" indent="0" algn="l" defTabSz="455612" rtl="0" eaLnBrk="1" hangingPunct="1">
+                <a:buNone/>
+                <a:defRPr lang="en-US" altLang="en-US" sz="1800">
+                  <a:solidFill>
+                    <a:schemeClr val="tx1"/>
+                  </a:solidFill>
+                  <a:latin typeface="Arial"/>
+                  <a:ea typeface="Arial"/>
+                </a:defRPr>
+              </a:lvl2pPr>
+              <a:lvl3pPr marL="912812" indent="0" algn="l" defTabSz="455612" rtl="0" eaLnBrk="1" hangingPunct="1">
+                <a:buNone/>
+                <a:defRPr lang="en-US" altLang="en-US" sz="1800">
+                  <a:solidFill>
+                    <a:schemeClr val="tx1"/>
+                  </a:solidFill>
+                  <a:latin typeface="Arial"/>
+                  <a:ea typeface="Arial"/>
+                </a:defRPr>
+              </a:lvl3pPr>
+              <a:lvl4pPr marL="1370012" indent="0" algn="l" defTabSz="455612" rtl="0" eaLnBrk="1" hangingPunct="1">
+                <a:buNone/>
+                <a:defRPr lang="en-US" altLang="en-US" sz="1800">
+                  <a:solidFill>
+                    <a:schemeClr val="tx1"/>
+                  </a:solidFill>
+                  <a:latin typeface="Arial"/>
+                  <a:ea typeface="Arial"/>
+                </a:defRPr>
+              </a:lvl4pPr>
+              <a:lvl5pPr marL="1827212" indent="0" algn="l" defTabSz="455612" rtl="0" eaLnBrk="1" hangingPunct="1">
+                <a:buNone/>
+                <a:defRPr lang="en-US" altLang="en-US" sz="1800">
+                  <a:solidFill>
+                    <a:schemeClr val="tx1"/>
+                  </a:solidFill>
+                  <a:latin typeface="Arial"/>
+                  <a:ea typeface="Arial"/>
+                </a:defRPr>
+              </a:lvl5pPr>
+            </a:lstStyle>
+            <a:p>
+              <a:pPr algn="l"/>
+              <a:r>
+                <a:rPr lang="en-US" altLang="en-US" sz="1600" dirty="0">
+                  <a:solidFill>
+                    <a:srgbClr val="024477"/>
+                  </a:solidFill>
+                  <a:latin typeface="Gill Sans MT" panose="020B0502020104020203" pitchFamily="34" charset="77"/>
+                </a:rPr>
+                <a:t>This is a nested shape with content in 2 shapes</a:t>
+              </a:r>
+            </a:p>
+            <a:p>
+              <a:pPr marL="285750" indent="-285750" algn="l">
+                <a:buFont typeface="Arial" panose="020B0604020202020204" pitchFamily="34" charset="0"/>
+                <a:buChar char="•"/>
+              </a:pPr>
+              <a:r>
+                <a:rPr lang="en-US" altLang="en-US" sz="1600" b="1" dirty="0">
+                  <a:solidFill>
+                    <a:srgbClr val="024477"/>
+                  </a:solidFill>
+                  <a:latin typeface="Gill Sans MT" panose="020B0502020104020203" pitchFamily="34" charset="77"/>
+                </a:rPr>
+                <a:t>Comment 1</a:t>
+              </a:r>
+              <a:endParaRPr lang="en-US" altLang="en-US" sz="1600" dirty="0">
+                <a:solidFill>
+                  <a:srgbClr val="024477"/>
+                </a:solidFill>
+                <a:latin typeface="Gill Sans MT" panose="020B0502020104020203" pitchFamily="34" charset="77"/>
+              </a:endParaRPr>
+            </a:p>
+            <a:p>
+              <a:pPr marL="285750" indent="-285750" algn="l">
+                <a:buFont typeface="Arial" panose="020B0604020202020204" pitchFamily="34" charset="0"/>
+                <a:buChar char="•"/>
+              </a:pPr>
+              <a:r>
+                <a:rPr lang="en-US" altLang="en-US" sz="1600" b="1" dirty="0">
+                  <a:solidFill>
+                    <a:srgbClr val="024477"/>
+                  </a:solidFill>
+                  <a:latin typeface="Gill Sans MT" panose="020B0502020104020203" pitchFamily="34" charset="77"/>
+                </a:rPr>
+                <a:t>Comment 2: </a:t>
+              </a:r>
+              <a:endParaRPr lang="en-US" altLang="en-US" sz="1600" dirty="0">
+                <a:solidFill>
+                  <a:srgbClr val="024477"/>
+                </a:solidFill>
+                <a:latin typeface="Gill Sans MT" panose="020B0502020104020203" pitchFamily="34" charset="77"/>
+              </a:endParaRPr>
+            </a:p>
+            <a:p>
+              <a:pPr marL="741362" lvl="1" indent="-285750">
+                <a:buFont typeface="Arial" panose="020B0604020202020204" pitchFamily="34" charset="0"/>
+                <a:buChar char="•"/>
+              </a:pPr>
+              <a:r>
+                <a:rPr lang="en-US" altLang="en-US" sz="1600" dirty="0">
+                  <a:solidFill>
+                    <a:srgbClr val="024477"/>
+                  </a:solidFill>
+                  <a:latin typeface="Gill Sans MT" panose="020B0502020104020203" pitchFamily="34" charset="77"/>
+                </a:rPr>
+                <a:t>Sub comment 2</a:t>
+              </a:r>
+            </a:p>
+          </p:txBody>
+        </p:sp>
+      </p:grpSp>
+    </p:spTree>
+    <p:extLst>
+      <p:ext uri="{BB962C8B-B14F-4D97-AF65-F5344CB8AC3E}">
+        <p14:creationId xmlns:p14="http://schemas.microsoft.com/office/powerpoint/2010/main" val="2860213974"/>
+      </p:ext>
+    </p:extLst>
+  </p:cSld>
+  <p:clrMapOvr>
+    <a:masterClrMapping/>
+  </p:clrMapOvr>
+</p:sld>
+</file>
+
 <file path=ppt/theme/theme1.xml><?xml version="1.0" encoding="utf-8"?>
 <a:theme xmlns:a="http://schemas.openxmlformats.org/drawingml/2006/main" name="Office Theme">
   <a:themeElements>

</xml_diff>

<commit_message>
Update converter API, user streams rather than file paths (#1088)
* Updated DocumentConverter interface
* Updated all DocumentConverter classes
* Added support for various new audio files.
* Updated sample plugin to new DocumentConverter interface.
* Updated project README with notes about changes, and use-cases.
* Updated DocumentConverter documentation.
* Move priority to outside DocumentConverter, allowing them to be reprioritized, and keeping the DocumentConverter interface simple.

---------

Co-authored-by: Kenny Zhang <kzhang678@gmail.com>
</commit_message>
<xml_diff>
--- a/packages/markitdown/tests/test_files/test.pptx
+++ b/packages/markitdown/tests/test_files/test.pptx
@@ -10,6 +10,7 @@
     <p:sldId id="258" r:id="rId4"/>
     <p:sldId id="259" r:id="rId5"/>
     <p:sldId id="260" r:id="rId6"/>
+    <p:sldId id="261" r:id="rId7"/>
   </p:sldIdLst>
   <p:sldSz cx="12192000" cy="6858000"/>
   <p:notesSz cx="6858000" cy="9144000"/>
@@ -1148,7 +1149,7 @@
           <a:p>
             <a:fld id="{71E1FA23-2560-4B92-B796-4AF66AC1B7E7}" type="datetimeFigureOut">
               <a:rPr lang="en-US" smtClean="0"/>
-              <a:t>2/12/2025</a:t>
+              <a:t>3/4/2025</a:t>
             </a:fld>
             <a:endParaRPr lang="en-US"/>
           </a:p>
@@ -1346,7 +1347,7 @@
           <a:p>
             <a:fld id="{71E1FA23-2560-4B92-B796-4AF66AC1B7E7}" type="datetimeFigureOut">
               <a:rPr lang="en-US" smtClean="0"/>
-              <a:t>2/12/2025</a:t>
+              <a:t>3/4/2025</a:t>
             </a:fld>
             <a:endParaRPr lang="en-US"/>
           </a:p>
@@ -1554,7 +1555,7 @@
           <a:p>
             <a:fld id="{71E1FA23-2560-4B92-B796-4AF66AC1B7E7}" type="datetimeFigureOut">
               <a:rPr lang="en-US" smtClean="0"/>
-              <a:t>2/12/2025</a:t>
+              <a:t>3/4/2025</a:t>
             </a:fld>
             <a:endParaRPr lang="en-US"/>
           </a:p>
@@ -1752,7 +1753,7 @@
           <a:p>
             <a:fld id="{71E1FA23-2560-4B92-B796-4AF66AC1B7E7}" type="datetimeFigureOut">
               <a:rPr lang="en-US" smtClean="0"/>
-              <a:t>2/12/2025</a:t>
+              <a:t>3/4/2025</a:t>
             </a:fld>
             <a:endParaRPr lang="en-US"/>
           </a:p>
@@ -2027,7 +2028,7 @@
           <a:p>
             <a:fld id="{71E1FA23-2560-4B92-B796-4AF66AC1B7E7}" type="datetimeFigureOut">
               <a:rPr lang="en-US" smtClean="0"/>
-              <a:t>2/12/2025</a:t>
+              <a:t>3/4/2025</a:t>
             </a:fld>
             <a:endParaRPr lang="en-US"/>
           </a:p>
@@ -2292,7 +2293,7 @@
           <a:p>
             <a:fld id="{71E1FA23-2560-4B92-B796-4AF66AC1B7E7}" type="datetimeFigureOut">
               <a:rPr lang="en-US" smtClean="0"/>
-              <a:t>2/12/2025</a:t>
+              <a:t>3/4/2025</a:t>
             </a:fld>
             <a:endParaRPr lang="en-US"/>
           </a:p>
@@ -2704,7 +2705,7 @@
           <a:p>
             <a:fld id="{71E1FA23-2560-4B92-B796-4AF66AC1B7E7}" type="datetimeFigureOut">
               <a:rPr lang="en-US" smtClean="0"/>
-              <a:t>2/12/2025</a:t>
+              <a:t>3/4/2025</a:t>
             </a:fld>
             <a:endParaRPr lang="en-US"/>
           </a:p>
@@ -2845,7 +2846,7 @@
           <a:p>
             <a:fld id="{71E1FA23-2560-4B92-B796-4AF66AC1B7E7}" type="datetimeFigureOut">
               <a:rPr lang="en-US" smtClean="0"/>
-              <a:t>2/12/2025</a:t>
+              <a:t>3/4/2025</a:t>
             </a:fld>
             <a:endParaRPr lang="en-US"/>
           </a:p>
@@ -2958,7 +2959,7 @@
           <a:p>
             <a:fld id="{71E1FA23-2560-4B92-B796-4AF66AC1B7E7}" type="datetimeFigureOut">
               <a:rPr lang="en-US" smtClean="0"/>
-              <a:t>2/12/2025</a:t>
+              <a:t>3/4/2025</a:t>
             </a:fld>
             <a:endParaRPr lang="en-US"/>
           </a:p>
@@ -3269,7 +3270,7 @@
           <a:p>
             <a:fld id="{71E1FA23-2560-4B92-B796-4AF66AC1B7E7}" type="datetimeFigureOut">
               <a:rPr lang="en-US" smtClean="0"/>
-              <a:t>2/12/2025</a:t>
+              <a:t>3/4/2025</a:t>
             </a:fld>
             <a:endParaRPr lang="en-US"/>
           </a:p>
@@ -3557,7 +3558,7 @@
           <a:p>
             <a:fld id="{71E1FA23-2560-4B92-B796-4AF66AC1B7E7}" type="datetimeFigureOut">
               <a:rPr lang="en-US" smtClean="0"/>
-              <a:t>2/12/2025</a:t>
+              <a:t>3/4/2025</a:t>
             </a:fld>
             <a:endParaRPr lang="en-US"/>
           </a:p>
@@ -3798,7 +3799,7 @@
           <a:p>
             <a:fld id="{71E1FA23-2560-4B92-B796-4AF66AC1B7E7}" type="datetimeFigureOut">
               <a:rPr lang="en-US" smtClean="0"/>
-              <a:t>2/12/2025</a:t>
+              <a:t>3/4/2025</a:t>
             </a:fld>
             <a:endParaRPr lang="en-US"/>
           </a:p>
@@ -5655,6 +5656,100 @@
 </p:sld>
 </file>
 
+<file path=ppt/slides/slide6.xml><?xml version="1.0" encoding="utf-8"?>
+<p:sld xmlns:a="http://schemas.openxmlformats.org/drawingml/2006/main" xmlns:r="http://schemas.openxmlformats.org/officeDocument/2006/relationships" xmlns:p="http://schemas.openxmlformats.org/presentationml/2006/main">
+  <p:cSld>
+    <p:spTree>
+      <p:nvGrpSpPr>
+        <p:cNvPr id="1" name=""/>
+        <p:cNvGrpSpPr/>
+        <p:nvPr/>
+      </p:nvGrpSpPr>
+      <p:grpSpPr>
+        <a:xfrm>
+          <a:off x="0" y="0"/>
+          <a:ext cx="0" cy="0"/>
+          <a:chOff x="0" y="0"/>
+          <a:chExt cx="0" cy="0"/>
+        </a:xfrm>
+      </p:grpSpPr>
+      <p:sp>
+        <p:nvSpPr>
+          <p:cNvPr id="2" name="Title 1">
+            <a:extLst>
+              <a:ext uri="{FF2B5EF4-FFF2-40B4-BE49-F238E27FC236}">
+                <a16:creationId xmlns:a16="http://schemas.microsoft.com/office/drawing/2014/main" id="{B847B24E-B38F-BDC8-DDD3-6F30C4865CE3}"/>
+              </a:ext>
+            </a:extLst>
+          </p:cNvPr>
+          <p:cNvSpPr>
+            <a:spLocks noGrp="1"/>
+          </p:cNvSpPr>
+          <p:nvPr>
+            <p:ph type="title"/>
+          </p:nvPr>
+        </p:nvSpPr>
+        <p:spPr/>
+        <p:txBody>
+          <a:bodyPr/>
+          <a:lstStyle/>
+          <a:p>
+            <a:r>
+              <a:rPr lang="en-US" dirty="0"/>
+              <a:t>These Test Strings are in the Image!</a:t>
+            </a:r>
+          </a:p>
+        </p:txBody>
+      </p:sp>
+      <p:pic>
+        <p:nvPicPr>
+          <p:cNvPr id="5" name="Picture 4" descr="This phrase of the caption is Human-written.">
+            <a:extLst>
+              <a:ext uri="{FF2B5EF4-FFF2-40B4-BE49-F238E27FC236}">
+                <a16:creationId xmlns:a16="http://schemas.microsoft.com/office/drawing/2014/main" id="{E7A85615-8041-0D8A-6EB0-C0162ECDD189}"/>
+              </a:ext>
+            </a:extLst>
+          </p:cNvPr>
+          <p:cNvPicPr>
+            <a:picLocks noChangeAspect="1"/>
+          </p:cNvPicPr>
+          <p:nvPr/>
+        </p:nvPicPr>
+        <p:blipFill>
+          <a:blip r:embed="rId2">
+            <a:extLst>
+              <a:ext uri="{28A0092B-C50C-407E-A947-70E740481C1C}">
+                <a14:useLocalDpi xmlns:a14="http://schemas.microsoft.com/office/drawing/2010/main" val="0"/>
+              </a:ext>
+            </a:extLst>
+          </a:blip>
+          <a:stretch>
+            <a:fillRect/>
+          </a:stretch>
+        </p:blipFill>
+        <p:spPr>
+          <a:xfrm>
+            <a:off x="2872740" y="1623060"/>
+            <a:ext cx="6446520" cy="3611880"/>
+          </a:xfrm>
+          <a:prstGeom prst="rect">
+            <a:avLst/>
+          </a:prstGeom>
+        </p:spPr>
+      </p:pic>
+    </p:spTree>
+    <p:extLst>
+      <p:ext uri="{BB962C8B-B14F-4D97-AF65-F5344CB8AC3E}">
+        <p14:creationId xmlns:p14="http://schemas.microsoft.com/office/powerpoint/2010/main" val="3971023608"/>
+      </p:ext>
+    </p:extLst>
+  </p:cSld>
+  <p:clrMapOvr>
+    <a:masterClrMapping/>
+  </p:clrMapOvr>
+</p:sld>
+</file>
+
 <file path=ppt/theme/theme1.xml><?xml version="1.0" encoding="utf-8"?>
 <a:theme xmlns:a="http://schemas.openxmlformats.org/drawingml/2006/main" name="Office Theme">
   <a:themeElements>

</xml_diff>